<commit_message>
TOM 08 Aufdrehen fertig los
CC Lizenz hinzugefügt
</commit_message>
<xml_diff>
--- a/training-cards/music moves/Tomatoes (TOM)/ger/apprentice/ger_TOM_08_Aufdrehen-fertig-los_MM_A.pptx
+++ b/training-cards/music moves/Tomatoes (TOM)/ger/apprentice/ger_TOM_08_Aufdrehen-fertig-los_MM_A.pptx
@@ -724,7 +724,7 @@
           <a:p>
             <a:fld id="{FF5B2BAF-DF38-0A48-A798-0C06E514FD52}" type="datetimeFigureOut">
               <a:rPr lang="de-DE" smtClean="0"/>
-              <a:t>29.08.18</a:t>
+              <a:t>03.09.18</a:t>
             </a:fld>
             <a:endParaRPr lang="de-DE" dirty="0"/>
           </a:p>
@@ -937,7 +937,7 @@
           <a:p>
             <a:fld id="{FF5B2BAF-DF38-0A48-A798-0C06E514FD52}" type="datetimeFigureOut">
               <a:rPr lang="de-DE" smtClean="0"/>
-              <a:t>29.08.18</a:t>
+              <a:t>03.09.18</a:t>
             </a:fld>
             <a:endParaRPr lang="de-DE" dirty="0"/>
           </a:p>
@@ -1979,6 +1979,161 @@
           </a:p>
         </p:txBody>
       </p:sp>
+      <p:sp>
+        <p:nvSpPr>
+          <p:cNvPr id="3" name="Shape 7">
+            <a:extLst>
+              <a:ext uri="{FF2B5EF4-FFF2-40B4-BE49-F238E27FC236}">
+                <a16:creationId xmlns:a16="http://schemas.microsoft.com/office/drawing/2014/main" id="{D2BAB869-8EF9-D840-9A9E-D36B01ED1AC2}"/>
+              </a:ext>
+            </a:extLst>
+          </p:cNvPr>
+          <p:cNvSpPr/>
+          <p:nvPr/>
+        </p:nvSpPr>
+        <p:spPr>
+          <a:xfrm>
+            <a:off x="1683417" y="4952581"/>
+            <a:ext cx="4196016" cy="276995"/>
+          </a:xfrm>
+          <a:prstGeom prst="rect">
+            <a:avLst/>
+          </a:prstGeom>
+          <a:ln w="12700">
+            <a:miter lim="400000"/>
+          </a:ln>
+          <a:extLst>
+            <a:ext uri="{C572A759-6A51-4108-AA02-DFA0A04FC94B}">
+              <ma14:wrappingTextBoxFlag xmlns="" xmlns:ma14="http://schemas.microsoft.com/office/mac/drawingml/2011/main" val="1"/>
+            </a:ext>
+          </a:extLst>
+        </p:spPr>
+        <p:txBody>
+          <a:bodyPr wrap="none" lIns="45718" tIns="45718" rIns="45718" bIns="45718">
+            <a:spAutoFit/>
+          </a:bodyPr>
+          <a:lstStyle/>
+          <a:p>
+            <a:pPr lvl="0" algn="ctr">
+              <a:defRPr sz="1800"/>
+            </a:pPr>
+            <a:r>
+              <a:rPr sz="600" dirty="0">
+                <a:latin typeface="Avenir Light"/>
+                <a:ea typeface="Calibri"/>
+                <a:cs typeface="Avenir Light"/>
+                <a:sym typeface="Calibri"/>
+              </a:rPr>
+              <a:t>This work is licensed under the Creative Commons Attribution-NonCommercial-NoDerivatives 4.0 International License. </a:t>
+            </a:r>
+          </a:p>
+          <a:p>
+            <a:pPr lvl="0" algn="ctr">
+              <a:defRPr sz="1800"/>
+            </a:pPr>
+            <a:r>
+              <a:rPr sz="600" dirty="0">
+                <a:latin typeface="Avenir Light"/>
+                <a:ea typeface="Calibri"/>
+                <a:cs typeface="Avenir Light"/>
+                <a:sym typeface="Calibri"/>
+              </a:rPr>
+              <a:t>To view a copy of this license, visit http://creativecommons.org/licenses/by-nc-nd/4.0/.</a:t>
+            </a:r>
+          </a:p>
+        </p:txBody>
+      </p:sp>
+      <p:pic>
+        <p:nvPicPr>
+          <p:cNvPr id="4" name="pasted-image.tif">
+            <a:extLst>
+              <a:ext uri="{FF2B5EF4-FFF2-40B4-BE49-F238E27FC236}">
+                <a16:creationId xmlns:a16="http://schemas.microsoft.com/office/drawing/2014/main" id="{3BB89C47-9383-AD4D-B85E-0C98B5FDF280}"/>
+              </a:ext>
+            </a:extLst>
+          </p:cNvPr>
+          <p:cNvPicPr/>
+          <p:nvPr/>
+        </p:nvPicPr>
+        <p:blipFill>
+          <a:blip r:embed="rId2">
+            <a:extLst/>
+          </a:blip>
+          <a:stretch>
+            <a:fillRect/>
+          </a:stretch>
+        </p:blipFill>
+        <p:spPr>
+          <a:xfrm>
+            <a:off x="6174185" y="4992838"/>
+            <a:ext cx="886619" cy="214128"/>
+          </a:xfrm>
+          <a:prstGeom prst="rect">
+            <a:avLst/>
+          </a:prstGeom>
+          <a:ln w="12700">
+            <a:miter lim="400000"/>
+          </a:ln>
+        </p:spPr>
+      </p:pic>
+      <p:sp>
+        <p:nvSpPr>
+          <p:cNvPr id="5" name="Textfeld 4">
+            <a:extLst>
+              <a:ext uri="{FF2B5EF4-FFF2-40B4-BE49-F238E27FC236}">
+                <a16:creationId xmlns:a16="http://schemas.microsoft.com/office/drawing/2014/main" id="{D7AF1C23-F128-5D4E-8326-7715E79EBA63}"/>
+              </a:ext>
+            </a:extLst>
+          </p:cNvPr>
+          <p:cNvSpPr txBox="1"/>
+          <p:nvPr/>
+        </p:nvSpPr>
+        <p:spPr>
+          <a:xfrm>
+            <a:off x="239285" y="4936890"/>
+            <a:ext cx="1044856" cy="276999"/>
+          </a:xfrm>
+          <a:prstGeom prst="rect">
+            <a:avLst/>
+          </a:prstGeom>
+          <a:noFill/>
+        </p:spPr>
+        <p:txBody>
+          <a:bodyPr wrap="square" rtlCol="0">
+            <a:spAutoFit/>
+          </a:bodyPr>
+          <a:lstStyle/>
+          <a:p>
+            <a:r>
+              <a:rPr lang="de-DE" sz="600" dirty="0">
+                <a:solidFill>
+                  <a:srgbClr val="5D5E5F"/>
+                </a:solidFill>
+                <a:latin typeface="Avenir Light"/>
+                <a:cs typeface="Avenir Light"/>
+              </a:rPr>
+              <a:t>Letzte Änderung: </a:t>
+            </a:r>
+            <a:fld id="{7A8C7DAC-E536-564C-B5B3-90E8FAB50562}" type="datetime1">
+              <a:rPr lang="de-DE" sz="600" smtClean="0">
+                <a:solidFill>
+                  <a:srgbClr val="5D5E5F"/>
+                </a:solidFill>
+                <a:latin typeface="Avenir Light"/>
+                <a:cs typeface="Avenir Light"/>
+              </a:rPr>
+              <a:t>03.09.18</a:t>
+            </a:fld>
+            <a:endParaRPr lang="de-DE" sz="600" dirty="0">
+              <a:solidFill>
+                <a:srgbClr val="5D5E5F"/>
+              </a:solidFill>
+              <a:latin typeface="Avenir Light"/>
+              <a:cs typeface="Avenir Light"/>
+            </a:endParaRPr>
+          </a:p>
+        </p:txBody>
+      </p:sp>
     </p:spTree>
     <p:extLst>
       <p:ext uri="{BB962C8B-B14F-4D97-AF65-F5344CB8AC3E}">

</xml_diff>

<commit_message>
TOM 08 wegen Promotion überarbeitet
</commit_message>
<xml_diff>
--- a/training-cards/music moves/Tomatoes (TOM)/ger/apprentice/ger_TOM_08_Aufdrehen-fertig-los_MM_A.pptx
+++ b/training-cards/music moves/Tomatoes (TOM)/ger/apprentice/ger_TOM_08_Aufdrehen-fertig-los_MM_A.pptx
@@ -724,7 +724,7 @@
           <a:p>
             <a:fld id="{FF5B2BAF-DF38-0A48-A798-0C06E514FD52}" type="datetimeFigureOut">
               <a:rPr lang="de-DE" smtClean="0"/>
-              <a:t>03.09.18</a:t>
+              <a:t>22.07.23</a:t>
             </a:fld>
             <a:endParaRPr lang="de-DE" dirty="0"/>
           </a:p>
@@ -937,7 +937,7 @@
           <a:p>
             <a:fld id="{FF5B2BAF-DF38-0A48-A798-0C06E514FD52}" type="datetimeFigureOut">
               <a:rPr lang="de-DE" smtClean="0"/>
-              <a:t>03.09.18</a:t>
+              <a:t>22.07.23</a:t>
             </a:fld>
             <a:endParaRPr lang="de-DE" dirty="0"/>
           </a:p>
@@ -1627,15 +1627,23 @@
             </a:r>
             <a:r>
               <a:rPr lang="de-DE" sz="1200" dirty="0"/>
-              <a:t> Technique®</a:t>
-            </a:r>
-            <a:r>
-              <a:rPr lang="de-DE" sz="1200" baseline="30000" dirty="0"/>
+              <a:t> Technique</a:t>
+            </a:r>
+            <a:r>
+              <a:rPr lang="de-DE" sz="1200"/>
+              <a:t>®</a:t>
+            </a:r>
+            <a:r>
+              <a:rPr lang="de-DE" sz="1200" baseline="30000"/>
               <a:t>1</a:t>
             </a:r>
             <a:r>
+              <a:rPr lang="de-DE" sz="1200"/>
+              <a:t> </a:t>
+            </a:r>
+            <a:r>
               <a:rPr lang="de-DE" sz="1200" dirty="0"/>
-              <a:t>  ist ein Zeitmanagementwerkzeug, das von Francesco </a:t>
+              <a:t>ist ein Zeitmanagementwerkzeug, das von Francesco </a:t>
             </a:r>
             <a:r>
               <a:rPr lang="de-DE" sz="1200" dirty="0" err="1"/>
@@ -2004,7 +2012,7 @@
           </a:ln>
           <a:extLst>
             <a:ext uri="{C572A759-6A51-4108-AA02-DFA0A04FC94B}">
-              <ma14:wrappingTextBoxFlag xmlns="" xmlns:ma14="http://schemas.microsoft.com/office/mac/drawingml/2011/main" val="1"/>
+              <ma14:wrappingTextBoxFlag xmlns:ma14="http://schemas.microsoft.com/office/mac/drawingml/2011/main" xmlns="" val="1"/>
             </a:ext>
           </a:extLst>
         </p:spPr>
@@ -2056,9 +2064,7 @@
           <p:nvPr/>
         </p:nvPicPr>
         <p:blipFill>
-          <a:blip r:embed="rId2">
-            <a:extLst/>
-          </a:blip>
+          <a:blip r:embed="rId2"/>
           <a:stretch>
             <a:fillRect/>
           </a:stretch>
@@ -2122,7 +2128,7 @@
                 <a:latin typeface="Avenir Light"/>
                 <a:cs typeface="Avenir Light"/>
               </a:rPr>
-              <a:t>03.09.18</a:t>
+              <a:t>22.07.23</a:t>
             </a:fld>
             <a:endParaRPr lang="de-DE" sz="600" dirty="0">
               <a:solidFill>

</xml_diff>

<commit_message>
TOM 16, 15, 14, 13, 12, 11, 10, 08 neue Lizenzen eingepflegt
Neue Lizenzen eingepflegt
</commit_message>
<xml_diff>
--- a/training-cards/music moves/Tomatoes (TOM)/ger/apprentice/ger_TOM_08_Aufdrehen-fertig-los_MM_A.pptx
+++ b/training-cards/music moves/Tomatoes (TOM)/ger/apprentice/ger_TOM_08_Aufdrehen-fertig-los_MM_A.pptx
@@ -724,7 +724,7 @@
           <a:p>
             <a:fld id="{FF5B2BAF-DF38-0A48-A798-0C06E514FD52}" type="datetimeFigureOut">
               <a:rPr lang="de-DE" smtClean="0"/>
-              <a:t>22.07.23</a:t>
+              <a:t>27.07.23</a:t>
             </a:fld>
             <a:endParaRPr lang="de-DE" dirty="0"/>
           </a:p>
@@ -937,7 +937,7 @@
           <a:p>
             <a:fld id="{FF5B2BAF-DF38-0A48-A798-0C06E514FD52}" type="datetimeFigureOut">
               <a:rPr lang="de-DE" smtClean="0"/>
-              <a:t>22.07.23</a:t>
+              <a:t>27.07.23</a:t>
             </a:fld>
             <a:endParaRPr lang="de-DE" dirty="0"/>
           </a:p>
@@ -1989,10 +1989,10 @@
       </p:sp>
       <p:sp>
         <p:nvSpPr>
-          <p:cNvPr id="3" name="Shape 7">
+          <p:cNvPr id="6" name="Shape 7">
             <a:extLst>
               <a:ext uri="{FF2B5EF4-FFF2-40B4-BE49-F238E27FC236}">
-                <a16:creationId xmlns:a16="http://schemas.microsoft.com/office/drawing/2014/main" id="{D2BAB869-8EF9-D840-9A9E-D36B01ED1AC2}"/>
+                <a16:creationId xmlns:a16="http://schemas.microsoft.com/office/drawing/2014/main" id="{B789B0D2-4ECE-8995-8093-029570036451}"/>
               </a:ext>
             </a:extLst>
           </p:cNvPr>
@@ -2001,8 +2001,8 @@
         </p:nvSpPr>
         <p:spPr>
           <a:xfrm>
-            <a:off x="1683417" y="4952581"/>
-            <a:ext cx="4196016" cy="276995"/>
+            <a:off x="971550" y="4689585"/>
+            <a:ext cx="4691860" cy="461661"/>
           </a:xfrm>
           <a:prstGeom prst="rect">
             <a:avLst/>
@@ -2012,12 +2012,12 @@
           </a:ln>
           <a:extLst>
             <a:ext uri="{C572A759-6A51-4108-AA02-DFA0A04FC94B}">
-              <ma14:wrappingTextBoxFlag xmlns:ma14="http://schemas.microsoft.com/office/mac/drawingml/2011/main" xmlns="" val="1"/>
+              <ma14:wrappingTextBoxFlag xmlns="" xmlns:ma14="http://schemas.microsoft.com/office/mac/drawingml/2011/main" val="1"/>
             </a:ext>
           </a:extLst>
         </p:spPr>
         <p:txBody>
-          <a:bodyPr wrap="none" lIns="45718" tIns="45718" rIns="45718" bIns="45718">
+          <a:bodyPr wrap="square" lIns="45718" tIns="45718" rIns="45718" bIns="45718">
             <a:spAutoFit/>
           </a:bodyPr>
           <a:lstStyle/>
@@ -2026,53 +2026,266 @@
               <a:defRPr sz="1800"/>
             </a:pPr>
             <a:r>
-              <a:rPr sz="600" dirty="0">
-                <a:latin typeface="Avenir Light"/>
+              <a:rPr lang="de-DE" sz="800" b="0" i="0" u="none" strike="noStrike" dirty="0" err="1">
+                <a:solidFill>
+                  <a:schemeClr val="tx1">
+                    <a:lumMod val="65000"/>
+                    <a:lumOff val="35000"/>
+                  </a:schemeClr>
+                </a:solidFill>
+                <a:effectLst/>
+                <a:latin typeface="Avenir Book" panose="02000503020000020003" pitchFamily="2" charset="0"/>
+              </a:rPr>
+              <a:t>music</a:t>
+            </a:r>
+            <a:r>
+              <a:rPr lang="de-DE" sz="800" b="0" i="0" u="none" strike="noStrike" dirty="0">
+                <a:solidFill>
+                  <a:schemeClr val="tx1">
+                    <a:lumMod val="65000"/>
+                    <a:lumOff val="35000"/>
+                  </a:schemeClr>
+                </a:solidFill>
+                <a:effectLst/>
+                <a:latin typeface="Avenir Book" panose="02000503020000020003" pitchFamily="2" charset="0"/>
+              </a:rPr>
+              <a:t> </a:t>
+            </a:r>
+            <a:r>
+              <a:rPr lang="de-DE" sz="800" b="0" i="0" u="none" strike="noStrike" dirty="0" err="1">
+                <a:solidFill>
+                  <a:schemeClr val="tx1">
+                    <a:lumMod val="65000"/>
+                    <a:lumOff val="35000"/>
+                  </a:schemeClr>
+                </a:solidFill>
+                <a:effectLst/>
+                <a:latin typeface="Avenir Book" panose="02000503020000020003" pitchFamily="2" charset="0"/>
+              </a:rPr>
+              <a:t>moves</a:t>
+            </a:r>
+            <a:r>
+              <a:rPr lang="de-DE" sz="800" b="0" i="0" u="none" strike="noStrike" dirty="0">
+                <a:solidFill>
+                  <a:schemeClr val="tx1">
+                    <a:lumMod val="65000"/>
+                    <a:lumOff val="35000"/>
+                  </a:schemeClr>
+                </a:solidFill>
+                <a:effectLst/>
+                <a:latin typeface="Avenir Book" panose="02000503020000020003" pitchFamily="2" charset="0"/>
+              </a:rPr>
+              <a:t>-Trainingskarten von Regina Brandhuber sind lizenziert unter einer Creative Commons </a:t>
+            </a:r>
+          </a:p>
+          <a:p>
+            <a:pPr lvl="0" algn="ctr">
+              <a:defRPr sz="1800"/>
+            </a:pPr>
+            <a:r>
+              <a:rPr lang="de-DE" sz="800" b="0" i="0" u="none" strike="noStrike" dirty="0">
+                <a:solidFill>
+                  <a:schemeClr val="tx1">
+                    <a:lumMod val="65000"/>
+                    <a:lumOff val="35000"/>
+                  </a:schemeClr>
+                </a:solidFill>
+                <a:effectLst/>
+                <a:latin typeface="Avenir Book" panose="02000503020000020003" pitchFamily="2" charset="0"/>
+              </a:rPr>
+              <a:t>Namensnennung-Nicht kommerziell 4.0 International Lizenz.</a:t>
+            </a:r>
+          </a:p>
+          <a:p>
+            <a:pPr lvl="0" algn="ctr">
+              <a:defRPr sz="1800"/>
+            </a:pPr>
+            <a:r>
+              <a:rPr lang="de-DE" sz="800" dirty="0">
+                <a:solidFill>
+                  <a:schemeClr val="tx1">
+                    <a:lumMod val="65000"/>
+                    <a:lumOff val="35000"/>
+                  </a:schemeClr>
+                </a:solidFill>
+                <a:latin typeface="Avenir Book" panose="02000503020000020003" pitchFamily="2" charset="0"/>
                 <a:ea typeface="Calibri"/>
                 <a:cs typeface="Avenir Light"/>
                 <a:sym typeface="Calibri"/>
               </a:rPr>
-              <a:t>This work is licensed under the Creative Commons Attribution-NonCommercial-NoDerivatives 4.0 International License. </a:t>
-            </a:r>
-          </a:p>
-          <a:p>
-            <a:pPr lvl="0" algn="ctr">
-              <a:defRPr sz="1800"/>
-            </a:pPr>
-            <a:r>
-              <a:rPr sz="600" dirty="0">
-                <a:latin typeface="Avenir Light"/>
+              <a:t>Nachzulesen unter:</a:t>
+            </a:r>
+            <a:r>
+              <a:rPr sz="800" dirty="0">
+                <a:solidFill>
+                  <a:schemeClr val="tx1">
+                    <a:lumMod val="65000"/>
+                    <a:lumOff val="35000"/>
+                  </a:schemeClr>
+                </a:solidFill>
+                <a:latin typeface="Avenir Book" panose="02000503020000020003" pitchFamily="2" charset="0"/>
                 <a:ea typeface="Calibri"/>
                 <a:cs typeface="Avenir Light"/>
                 <a:sym typeface="Calibri"/>
               </a:rPr>
-              <a:t>To view a copy of this license, visit http://creativecommons.org/licenses/by-nc-nd/4.0/.</a:t>
-            </a:r>
+              <a:t> </a:t>
+            </a:r>
+            <a:r>
+              <a:rPr lang="de-DE" sz="800" dirty="0">
+                <a:solidFill>
+                  <a:schemeClr val="tx1">
+                    <a:lumMod val="65000"/>
+                    <a:lumOff val="35000"/>
+                  </a:schemeClr>
+                </a:solidFill>
+                <a:latin typeface="Avenir Book" panose="02000503020000020003" pitchFamily="2" charset="0"/>
+                <a:ea typeface="Calibri"/>
+                <a:cs typeface="Avenir Light"/>
+                <a:sym typeface="Calibri"/>
+              </a:rPr>
+              <a:t>https://</a:t>
+            </a:r>
+            <a:r>
+              <a:rPr lang="de-DE" sz="800" dirty="0" err="1">
+                <a:solidFill>
+                  <a:schemeClr val="tx1">
+                    <a:lumMod val="65000"/>
+                    <a:lumOff val="35000"/>
+                  </a:schemeClr>
+                </a:solidFill>
+                <a:latin typeface="Avenir Book" panose="02000503020000020003" pitchFamily="2" charset="0"/>
+                <a:ea typeface="Calibri"/>
+                <a:cs typeface="Avenir Light"/>
+                <a:sym typeface="Calibri"/>
+              </a:rPr>
+              <a:t>creativecommons.org</a:t>
+            </a:r>
+            <a:r>
+              <a:rPr lang="de-DE" sz="800" dirty="0">
+                <a:solidFill>
+                  <a:schemeClr val="tx1">
+                    <a:lumMod val="65000"/>
+                    <a:lumOff val="35000"/>
+                  </a:schemeClr>
+                </a:solidFill>
+                <a:latin typeface="Avenir Book" panose="02000503020000020003" pitchFamily="2" charset="0"/>
+                <a:ea typeface="Calibri"/>
+                <a:cs typeface="Avenir Light"/>
+                <a:sym typeface="Calibri"/>
+              </a:rPr>
+              <a:t>/</a:t>
+            </a:r>
+            <a:r>
+              <a:rPr lang="de-DE" sz="800" dirty="0" err="1">
+                <a:solidFill>
+                  <a:schemeClr val="tx1">
+                    <a:lumMod val="65000"/>
+                    <a:lumOff val="35000"/>
+                  </a:schemeClr>
+                </a:solidFill>
+                <a:latin typeface="Avenir Book" panose="02000503020000020003" pitchFamily="2" charset="0"/>
+                <a:ea typeface="Calibri"/>
+                <a:cs typeface="Avenir Light"/>
+                <a:sym typeface="Calibri"/>
+              </a:rPr>
+              <a:t>licenses</a:t>
+            </a:r>
+            <a:r>
+              <a:rPr lang="de-DE" sz="800" dirty="0">
+                <a:solidFill>
+                  <a:schemeClr val="tx1">
+                    <a:lumMod val="65000"/>
+                    <a:lumOff val="35000"/>
+                  </a:schemeClr>
+                </a:solidFill>
+                <a:latin typeface="Avenir Book" panose="02000503020000020003" pitchFamily="2" charset="0"/>
+                <a:ea typeface="Calibri"/>
+                <a:cs typeface="Avenir Light"/>
+                <a:sym typeface="Calibri"/>
+              </a:rPr>
+              <a:t>/</a:t>
+            </a:r>
+            <a:r>
+              <a:rPr lang="de-DE" sz="800" dirty="0" err="1">
+                <a:solidFill>
+                  <a:schemeClr val="tx1">
+                    <a:lumMod val="65000"/>
+                    <a:lumOff val="35000"/>
+                  </a:schemeClr>
+                </a:solidFill>
+                <a:latin typeface="Avenir Book" panose="02000503020000020003" pitchFamily="2" charset="0"/>
+                <a:ea typeface="Calibri"/>
+                <a:cs typeface="Avenir Light"/>
+                <a:sym typeface="Calibri"/>
+              </a:rPr>
+              <a:t>by-nc</a:t>
+            </a:r>
+            <a:r>
+              <a:rPr lang="de-DE" sz="800" dirty="0">
+                <a:solidFill>
+                  <a:schemeClr val="tx1">
+                    <a:lumMod val="65000"/>
+                    <a:lumOff val="35000"/>
+                  </a:schemeClr>
+                </a:solidFill>
+                <a:latin typeface="Avenir Book" panose="02000503020000020003" pitchFamily="2" charset="0"/>
+                <a:ea typeface="Calibri"/>
+                <a:cs typeface="Avenir Light"/>
+                <a:sym typeface="Calibri"/>
+              </a:rPr>
+              <a:t>/4.0/</a:t>
+            </a:r>
+            <a:r>
+              <a:rPr lang="de-DE" sz="800" dirty="0" err="1">
+                <a:solidFill>
+                  <a:schemeClr val="tx1">
+                    <a:lumMod val="65000"/>
+                    <a:lumOff val="35000"/>
+                  </a:schemeClr>
+                </a:solidFill>
+                <a:latin typeface="Avenir Book" panose="02000503020000020003" pitchFamily="2" charset="0"/>
+                <a:ea typeface="Calibri"/>
+                <a:cs typeface="Avenir Light"/>
+                <a:sym typeface="Calibri"/>
+              </a:rPr>
+              <a:t>deed.de</a:t>
+            </a:r>
+            <a:endParaRPr sz="800" dirty="0">
+              <a:solidFill>
+                <a:schemeClr val="tx1">
+                  <a:lumMod val="65000"/>
+                  <a:lumOff val="35000"/>
+                </a:schemeClr>
+              </a:solidFill>
+              <a:latin typeface="Avenir Book" panose="02000503020000020003" pitchFamily="2" charset="0"/>
+              <a:ea typeface="Calibri"/>
+              <a:cs typeface="Avenir Light"/>
+              <a:sym typeface="Calibri"/>
+            </a:endParaRPr>
           </a:p>
         </p:txBody>
       </p:sp>
       <p:pic>
         <p:nvPicPr>
-          <p:cNvPr id="4" name="pasted-image.tif">
+          <p:cNvPr id="7" name="pasted-image.tif">
             <a:extLst>
               <a:ext uri="{FF2B5EF4-FFF2-40B4-BE49-F238E27FC236}">
-                <a16:creationId xmlns:a16="http://schemas.microsoft.com/office/drawing/2014/main" id="{3BB89C47-9383-AD4D-B85E-0C98B5FDF280}"/>
+                <a16:creationId xmlns:a16="http://schemas.microsoft.com/office/drawing/2014/main" id="{FBAB421B-8977-44B0-3959-D95563FCEEF4}"/>
               </a:ext>
             </a:extLst>
           </p:cNvPr>
           <p:cNvPicPr/>
           <p:nvPr/>
         </p:nvPicPr>
-        <p:blipFill>
+        <p:blipFill rotWithShape="1">
           <a:blip r:embed="rId2"/>
-          <a:stretch>
-            <a:fillRect/>
-          </a:stretch>
+          <a:srcRect r="24777" b="-3233"/>
+          <a:stretch/>
         </p:blipFill>
         <p:spPr>
           <a:xfrm>
-            <a:off x="6174185" y="4992838"/>
-            <a:ext cx="886619" cy="214128"/>
+            <a:off x="5724347" y="4733926"/>
+            <a:ext cx="1009828" cy="333374"/>
           </a:xfrm>
           <a:prstGeom prst="rect">
             <a:avLst/>
@@ -2082,64 +2295,6 @@
           </a:ln>
         </p:spPr>
       </p:pic>
-      <p:sp>
-        <p:nvSpPr>
-          <p:cNvPr id="5" name="Textfeld 4">
-            <a:extLst>
-              <a:ext uri="{FF2B5EF4-FFF2-40B4-BE49-F238E27FC236}">
-                <a16:creationId xmlns:a16="http://schemas.microsoft.com/office/drawing/2014/main" id="{D7AF1C23-F128-5D4E-8326-7715E79EBA63}"/>
-              </a:ext>
-            </a:extLst>
-          </p:cNvPr>
-          <p:cNvSpPr txBox="1"/>
-          <p:nvPr/>
-        </p:nvSpPr>
-        <p:spPr>
-          <a:xfrm>
-            <a:off x="239285" y="4936890"/>
-            <a:ext cx="1044856" cy="276999"/>
-          </a:xfrm>
-          <a:prstGeom prst="rect">
-            <a:avLst/>
-          </a:prstGeom>
-          <a:noFill/>
-        </p:spPr>
-        <p:txBody>
-          <a:bodyPr wrap="square" rtlCol="0">
-            <a:spAutoFit/>
-          </a:bodyPr>
-          <a:lstStyle/>
-          <a:p>
-            <a:r>
-              <a:rPr lang="de-DE" sz="600" dirty="0">
-                <a:solidFill>
-                  <a:srgbClr val="5D5E5F"/>
-                </a:solidFill>
-                <a:latin typeface="Avenir Light"/>
-                <a:cs typeface="Avenir Light"/>
-              </a:rPr>
-              <a:t>Letzte Änderung: </a:t>
-            </a:r>
-            <a:fld id="{7A8C7DAC-E536-564C-B5B3-90E8FAB50562}" type="datetime1">
-              <a:rPr lang="de-DE" sz="600" smtClean="0">
-                <a:solidFill>
-                  <a:srgbClr val="5D5E5F"/>
-                </a:solidFill>
-                <a:latin typeface="Avenir Light"/>
-                <a:cs typeface="Avenir Light"/>
-              </a:rPr>
-              <a:t>22.07.23</a:t>
-            </a:fld>
-            <a:endParaRPr lang="de-DE" sz="600" dirty="0">
-              <a:solidFill>
-                <a:srgbClr val="5D5E5F"/>
-              </a:solidFill>
-              <a:latin typeface="Avenir Light"/>
-              <a:cs typeface="Avenir Light"/>
-            </a:endParaRPr>
-          </a:p>
-        </p:txBody>
-      </p:sp>
     </p:spTree>
     <p:extLst>
       <p:ext uri="{BB962C8B-B14F-4D97-AF65-F5344CB8AC3E}">

</xml_diff>